<commit_message>
Corrected presentation typos and reran my code
</commit_message>
<xml_diff>
--- a/environment/Capstone Presentation Slides.pptx
+++ b/environment/Capstone Presentation Slides.pptx
@@ -6,14 +6,16 @@
   </p:sldMasterIdLst>
   <p:sldIdLst>
     <p:sldId id="256" r:id="rId2"/>
-    <p:sldId id="260" r:id="rId3"/>
-    <p:sldId id="258" r:id="rId4"/>
-    <p:sldId id="261" r:id="rId5"/>
-    <p:sldId id="263" r:id="rId6"/>
-    <p:sldId id="257" r:id="rId7"/>
-    <p:sldId id="259" r:id="rId8"/>
-    <p:sldId id="265" r:id="rId9"/>
-    <p:sldId id="264" r:id="rId10"/>
+    <p:sldId id="266" r:id="rId3"/>
+    <p:sldId id="260" r:id="rId4"/>
+    <p:sldId id="258" r:id="rId5"/>
+    <p:sldId id="261" r:id="rId6"/>
+    <p:sldId id="263" r:id="rId7"/>
+    <p:sldId id="257" r:id="rId8"/>
+    <p:sldId id="259" r:id="rId9"/>
+    <p:sldId id="265" r:id="rId10"/>
+    <p:sldId id="264" r:id="rId11"/>
+    <p:sldId id="267" r:id="rId12"/>
   </p:sldIdLst>
   <p:sldSz cx="12192000" cy="6858000"/>
   <p:notesSz cx="6858000" cy="9144000"/>
@@ -112,6 +114,11 @@
       </a:defRPr>
     </a:lvl9pPr>
   </p:defaultTextStyle>
+  <p:extLst>
+    <p:ext uri="{EFAFB233-063F-42B5-8137-9DF3F51BA10A}">
+      <p15:sldGuideLst xmlns:p15="http://schemas.microsoft.com/office/powerpoint/2012/main"/>
+    </p:ext>
+  </p:extLst>
 </p:presentation>
 </file>
 
@@ -269,7 +276,7 @@
           <a:p>
             <a:fld id="{6444479B-705B-4489-957E-7E8A228BDFA0}" type="datetime1">
               <a:rPr lang="en-US" smtClean="0"/>
-              <a:t>4/24/2025</a:t>
+              <a:t>4/25/2025</a:t>
             </a:fld>
             <a:endParaRPr lang="en-US"/>
           </a:p>
@@ -508,7 +515,7 @@
           <a:p>
             <a:fld id="{7DA38F49-B3E2-4BF0-BEC7-C30D34ABBB8D}" type="datetime1">
               <a:rPr lang="en-US" smtClean="0"/>
-              <a:t>4/24/2025</a:t>
+              <a:t>4/25/2025</a:t>
             </a:fld>
             <a:endParaRPr lang="en-US"/>
           </a:p>
@@ -1502,7 +1509,1032 @@
 </p:sld>
 </file>
 
+<file path=ppt/slides/slide10.xml><?xml version="1.0" encoding="utf-8"?>
+<p:sld xmlns:a="http://schemas.openxmlformats.org/drawingml/2006/main" xmlns:r="http://schemas.openxmlformats.org/officeDocument/2006/relationships" xmlns:p="http://schemas.openxmlformats.org/presentationml/2006/main">
+  <p:cSld>
+    <p:spTree>
+      <p:nvGrpSpPr>
+        <p:cNvPr id="1" name="">
+          <a:extLst>
+            <a:ext uri="{FF2B5EF4-FFF2-40B4-BE49-F238E27FC236}">
+              <a16:creationId xmlns:a16="http://schemas.microsoft.com/office/drawing/2014/main" id="{29E9DEE3-D995-A92B-C733-D20004C134AC}"/>
+            </a:ext>
+          </a:extLst>
+        </p:cNvPr>
+        <p:cNvGrpSpPr/>
+        <p:nvPr/>
+      </p:nvGrpSpPr>
+      <p:grpSpPr>
+        <a:xfrm>
+          <a:off x="0" y="0"/>
+          <a:ext cx="0" cy="0"/>
+          <a:chOff x="0" y="0"/>
+          <a:chExt cx="0" cy="0"/>
+        </a:xfrm>
+      </p:grpSpPr>
+      <p:sp>
+        <p:nvSpPr>
+          <p:cNvPr id="22" name="Title 1">
+            <a:extLst>
+              <a:ext uri="{FF2B5EF4-FFF2-40B4-BE49-F238E27FC236}">
+                <a16:creationId xmlns:a16="http://schemas.microsoft.com/office/drawing/2014/main" id="{51BCFCF0-7319-6925-A648-ED5D9EA2C53C}"/>
+              </a:ext>
+            </a:extLst>
+          </p:cNvPr>
+          <p:cNvSpPr txBox="1">
+            <a:spLocks noGrp="1"/>
+          </p:cNvSpPr>
+          <p:nvPr>
+            <p:ph type="ctrTitle"/>
+          </p:nvPr>
+        </p:nvSpPr>
+        <p:spPr>
+          <a:xfrm>
+            <a:off x="2110581" y="1549400"/>
+            <a:ext cx="7970837" cy="4165600"/>
+          </a:xfrm>
+          <a:prstGeom prst="rect">
+            <a:avLst/>
+          </a:prstGeom>
+        </p:spPr>
+        <p:txBody>
+          <a:bodyPr vert="horz" lIns="91440" tIns="45720" rIns="91440" bIns="45720" rtlCol="0" anchor="t">
+            <a:normAutofit/>
+          </a:bodyPr>
+          <a:lstStyle>
+            <a:lvl1pPr algn="l" defTabSz="914400" rtl="0" eaLnBrk="1" latinLnBrk="0" hangingPunct="1">
+              <a:lnSpc>
+                <a:spcPct val="100000"/>
+              </a:lnSpc>
+              <a:spcBef>
+                <a:spcPct val="0"/>
+              </a:spcBef>
+              <a:buNone/>
+              <a:defRPr sz="5400" b="1" kern="1200">
+                <a:solidFill>
+                  <a:schemeClr val="tx1"/>
+                </a:solidFill>
+                <a:latin typeface="+mj-lt"/>
+                <a:ea typeface="+mj-ea"/>
+                <a:cs typeface="+mj-cs"/>
+              </a:defRPr>
+            </a:lvl1pPr>
+          </a:lstStyle>
+          <a:p>
+            <a:pPr algn="ctr"/>
+            <a:r>
+              <a:rPr lang="en-US" sz="2400" dirty="0"/>
+              <a:t>ETL Results</a:t>
+            </a:r>
+            <a:br>
+              <a:rPr lang="en-US" sz="2400" dirty="0"/>
+            </a:br>
+            <a:br>
+              <a:rPr lang="en-US" sz="2400" dirty="0"/>
+            </a:br>
+            <a:r>
+              <a:rPr lang="en-US" sz="2400" b="0" u="sng" dirty="0"/>
+              <a:t>Company Key Metrics </a:t>
+            </a:r>
+            <a:br>
+              <a:rPr lang="en-US" sz="2400" b="0" dirty="0"/>
+            </a:br>
+            <a:r>
+              <a:rPr lang="en-US" sz="1800" b="0" dirty="0"/>
+              <a:t>Line Graphs of every companies Net Income, Sales, and Operating Income</a:t>
+            </a:r>
+            <a:br>
+              <a:rPr lang="en-US" sz="1800" b="0" dirty="0"/>
+            </a:br>
+            <a:br>
+              <a:rPr lang="en-US" sz="1800" b="0" dirty="0"/>
+            </a:br>
+            <a:r>
+              <a:rPr lang="en-US" sz="2400" b="0" u="sng" dirty="0"/>
+              <a:t>Multiple Company Comparison</a:t>
+            </a:r>
+            <a:br>
+              <a:rPr lang="en-US" sz="2400" b="0" dirty="0"/>
+            </a:br>
+            <a:r>
+              <a:rPr lang="en-US" sz="1800" b="0" dirty="0"/>
+              <a:t>Bar Graph comparison of every companies Net Income, Sales, and Operating Income</a:t>
+            </a:r>
+            <a:br>
+              <a:rPr lang="en-US" sz="1800" b="0" dirty="0"/>
+            </a:br>
+            <a:br>
+              <a:rPr lang="en-US" sz="2400" b="0" dirty="0"/>
+            </a:br>
+            <a:r>
+              <a:rPr lang="en-US" sz="2400" b="0" dirty="0">
+                <a:hlinkClick r:id="rId2"/>
+              </a:rPr>
+              <a:t>Click to open Dash</a:t>
+            </a:r>
+            <a:endParaRPr lang="en-US" sz="2400" b="0" dirty="0"/>
+          </a:p>
+        </p:txBody>
+      </p:sp>
+      <p:pic>
+        <p:nvPicPr>
+          <p:cNvPr id="4" name="Picture 3">
+            <a:extLst>
+              <a:ext uri="{FF2B5EF4-FFF2-40B4-BE49-F238E27FC236}">
+                <a16:creationId xmlns:a16="http://schemas.microsoft.com/office/drawing/2014/main" id="{53F5F271-959D-DEF2-5F8A-9490C31B150A}"/>
+              </a:ext>
+            </a:extLst>
+          </p:cNvPr>
+          <p:cNvPicPr>
+            <a:picLocks noChangeAspect="1"/>
+          </p:cNvPicPr>
+          <p:nvPr/>
+        </p:nvPicPr>
+        <p:blipFill>
+          <a:blip r:embed="rId3"/>
+          <a:stretch>
+            <a:fillRect/>
+          </a:stretch>
+        </p:blipFill>
+        <p:spPr>
+          <a:xfrm>
+            <a:off x="653851" y="4312693"/>
+            <a:ext cx="2174669" cy="2180231"/>
+          </a:xfrm>
+          <a:prstGeom prst="rect">
+            <a:avLst/>
+          </a:prstGeom>
+        </p:spPr>
+      </p:pic>
+      <p:pic>
+        <p:nvPicPr>
+          <p:cNvPr id="6" name="Graphic 5" descr="Bar chart with solid fill">
+            <a:extLst>
+              <a:ext uri="{FF2B5EF4-FFF2-40B4-BE49-F238E27FC236}">
+                <a16:creationId xmlns:a16="http://schemas.microsoft.com/office/drawing/2014/main" id="{C75A9FAD-6C7F-6189-9547-934AE267F083}"/>
+              </a:ext>
+            </a:extLst>
+          </p:cNvPr>
+          <p:cNvPicPr>
+            <a:picLocks noChangeAspect="1"/>
+          </p:cNvPicPr>
+          <p:nvPr/>
+        </p:nvPicPr>
+        <p:blipFill>
+          <a:blip r:embed="rId4">
+            <a:extLst>
+              <a:ext uri="{96DAC541-7B7A-43D3-8B79-37D633B846F1}">
+                <asvg:svgBlip xmlns:asvg="http://schemas.microsoft.com/office/drawing/2016/SVG/main" r:embed="rId5"/>
+              </a:ext>
+            </a:extLst>
+          </a:blip>
+          <a:stretch>
+            <a:fillRect/>
+          </a:stretch>
+        </p:blipFill>
+        <p:spPr>
+          <a:xfrm>
+            <a:off x="9326106" y="4647496"/>
+            <a:ext cx="1510624" cy="1510624"/>
+          </a:xfrm>
+          <a:prstGeom prst="rect">
+            <a:avLst/>
+          </a:prstGeom>
+        </p:spPr>
+      </p:pic>
+    </p:spTree>
+    <p:extLst>
+      <p:ext uri="{BB962C8B-B14F-4D97-AF65-F5344CB8AC3E}">
+        <p14:creationId xmlns:p14="http://schemas.microsoft.com/office/powerpoint/2010/main" val="2055929795"/>
+      </p:ext>
+    </p:extLst>
+  </p:cSld>
+  <p:clrMapOvr>
+    <a:masterClrMapping/>
+  </p:clrMapOvr>
+  <mc:AlternateContent xmlns:mc="http://schemas.openxmlformats.org/markup-compatibility/2006" xmlns:p15="http://schemas.microsoft.com/office/powerpoint/2012/main">
+    <mc:Choice Requires="p15">
+      <p:transition xmlns:p14="http://schemas.microsoft.com/office/powerpoint/2010/main" spd="slow" p14:dur="1250">
+        <p15:prstTrans prst="airplane"/>
+      </p:transition>
+    </mc:Choice>
+    <mc:Fallback xmlns="">
+      <p:transition spd="slow">
+        <p:fade/>
+      </p:transition>
+    </mc:Fallback>
+  </mc:AlternateContent>
+</p:sld>
+</file>
+
+<file path=ppt/slides/slide11.xml><?xml version="1.0" encoding="utf-8"?>
+<p:sld xmlns:a="http://schemas.openxmlformats.org/drawingml/2006/main" xmlns:r="http://schemas.openxmlformats.org/officeDocument/2006/relationships" xmlns:p="http://schemas.openxmlformats.org/presentationml/2006/main">
+  <p:cSld>
+    <p:spTree>
+      <p:nvGrpSpPr>
+        <p:cNvPr id="1" name="">
+          <a:extLst>
+            <a:ext uri="{FF2B5EF4-FFF2-40B4-BE49-F238E27FC236}">
+              <a16:creationId xmlns:a16="http://schemas.microsoft.com/office/drawing/2014/main" id="{61C92543-3F41-0A50-50E9-FF75BBDE0592}"/>
+            </a:ext>
+          </a:extLst>
+        </p:cNvPr>
+        <p:cNvGrpSpPr/>
+        <p:nvPr/>
+      </p:nvGrpSpPr>
+      <p:grpSpPr>
+        <a:xfrm>
+          <a:off x="0" y="0"/>
+          <a:ext cx="0" cy="0"/>
+          <a:chOff x="0" y="0"/>
+          <a:chExt cx="0" cy="0"/>
+        </a:xfrm>
+      </p:grpSpPr>
+      <p:sp>
+        <p:nvSpPr>
+          <p:cNvPr id="22" name="Title 1">
+            <a:extLst>
+              <a:ext uri="{FF2B5EF4-FFF2-40B4-BE49-F238E27FC236}">
+                <a16:creationId xmlns:a16="http://schemas.microsoft.com/office/drawing/2014/main" id="{1BB30A5A-7914-0B85-F6B7-146F5B5FDF0E}"/>
+              </a:ext>
+            </a:extLst>
+          </p:cNvPr>
+          <p:cNvSpPr txBox="1">
+            <a:spLocks noGrp="1"/>
+          </p:cNvSpPr>
+          <p:nvPr>
+            <p:ph type="ctrTitle"/>
+          </p:nvPr>
+        </p:nvSpPr>
+        <p:spPr>
+          <a:xfrm>
+            <a:off x="2110581" y="1549400"/>
+            <a:ext cx="7970837" cy="4165600"/>
+          </a:xfrm>
+          <a:prstGeom prst="rect">
+            <a:avLst/>
+          </a:prstGeom>
+        </p:spPr>
+        <p:txBody>
+          <a:bodyPr vert="horz" lIns="91440" tIns="45720" rIns="91440" bIns="45720" rtlCol="0" anchor="t">
+            <a:normAutofit fontScale="90000"/>
+          </a:bodyPr>
+          <a:lstStyle>
+            <a:lvl1pPr algn="l" defTabSz="914400" rtl="0" eaLnBrk="1" latinLnBrk="0" hangingPunct="1">
+              <a:lnSpc>
+                <a:spcPct val="100000"/>
+              </a:lnSpc>
+              <a:spcBef>
+                <a:spcPct val="0"/>
+              </a:spcBef>
+              <a:buNone/>
+              <a:defRPr sz="5400" b="1" kern="1200">
+                <a:solidFill>
+                  <a:schemeClr val="tx1"/>
+                </a:solidFill>
+                <a:latin typeface="+mj-lt"/>
+                <a:ea typeface="+mj-ea"/>
+                <a:cs typeface="+mj-cs"/>
+              </a:defRPr>
+            </a:lvl1pPr>
+          </a:lstStyle>
+          <a:p>
+            <a:pPr algn="ctr"/>
+            <a:r>
+              <a:rPr lang="en-US" sz="2400" dirty="0"/>
+              <a:t>Conclusion</a:t>
+            </a:r>
+            <a:br>
+              <a:rPr lang="en-US" sz="2400" dirty="0"/>
+            </a:br>
+            <a:br>
+              <a:rPr lang="en-US" sz="2400" dirty="0"/>
+            </a:br>
+            <a:r>
+              <a:rPr lang="en-US" sz="2400" u="sng" dirty="0"/>
+              <a:t>Machine Learning Model Prediction</a:t>
+            </a:r>
+            <a:br>
+              <a:rPr lang="en-US" sz="2400" b="0" u="sng" dirty="0"/>
+            </a:br>
+            <a:r>
+              <a:rPr lang="en-US" sz="2400" b="0" dirty="0"/>
+              <a:t>- </a:t>
+            </a:r>
+            <a:r>
+              <a:rPr lang="en-US" sz="1800" b="0" dirty="0"/>
+              <a:t>Successfully predicted historical EPS and future EPS using Gradient Boosted Trees</a:t>
+            </a:r>
+            <a:br>
+              <a:rPr lang="en-US" sz="1800" b="0" dirty="0"/>
+            </a:br>
+            <a:br>
+              <a:rPr lang="en-US" sz="1800" b="0" dirty="0"/>
+            </a:br>
+            <a:r>
+              <a:rPr lang="en-US" sz="2400" u="sng" dirty="0"/>
+              <a:t>ETL</a:t>
+            </a:r>
+            <a:br>
+              <a:rPr lang="en-US" sz="2400" b="0" dirty="0"/>
+            </a:br>
+            <a:r>
+              <a:rPr lang="en-US" sz="2400" b="0" dirty="0"/>
+              <a:t>- </a:t>
+            </a:r>
+            <a:r>
+              <a:rPr lang="en-US" sz="1800" b="0" dirty="0"/>
+              <a:t>Successfully extracted and cleaned data using Python and </a:t>
+            </a:r>
+            <a:r>
+              <a:rPr lang="en-US" sz="1800" b="0" dirty="0" err="1"/>
+              <a:t>PySpark</a:t>
+            </a:r>
+            <a:br>
+              <a:rPr lang="en-US" sz="1800" b="0" dirty="0"/>
+            </a:br>
+            <a:r>
+              <a:rPr lang="en-US" sz="1800" b="0" dirty="0"/>
+              <a:t>- Stored this data for ease of access using SQL</a:t>
+            </a:r>
+            <a:br>
+              <a:rPr lang="en-US" sz="1800" b="0" dirty="0"/>
+            </a:br>
+            <a:r>
+              <a:rPr lang="en-US" sz="1800" b="0" dirty="0"/>
+              <a:t>- Automated using Airflow for future scheduling of the task</a:t>
+            </a:r>
+            <a:br>
+              <a:rPr lang="en-US" sz="1800" b="0" dirty="0"/>
+            </a:br>
+            <a:r>
+              <a:rPr lang="en-US" sz="1800" b="0" dirty="0"/>
+              <a:t>- Used dash to display data for analysis</a:t>
+            </a:r>
+            <a:br>
+              <a:rPr lang="en-US" sz="1800" b="0" dirty="0"/>
+            </a:br>
+            <a:br>
+              <a:rPr lang="en-US" sz="1800" b="0" dirty="0"/>
+            </a:br>
+            <a:r>
+              <a:rPr lang="en-US" sz="2400" b="0" dirty="0">
+                <a:hlinkClick r:id="rId2"/>
+              </a:rPr>
+              <a:t>github.com/jayxu9000/epsPredictor</a:t>
+            </a:r>
+            <a:endParaRPr lang="en-US" sz="2400" b="0" dirty="0"/>
+          </a:p>
+        </p:txBody>
+      </p:sp>
+      <p:pic>
+        <p:nvPicPr>
+          <p:cNvPr id="3" name="Graphic 2" descr="Presentation with pie chart with solid fill">
+            <a:extLst>
+              <a:ext uri="{FF2B5EF4-FFF2-40B4-BE49-F238E27FC236}">
+                <a16:creationId xmlns:a16="http://schemas.microsoft.com/office/drawing/2014/main" id="{62513833-A536-98A9-AC74-1EC3108D1763}"/>
+              </a:ext>
+            </a:extLst>
+          </p:cNvPr>
+          <p:cNvPicPr>
+            <a:picLocks noChangeAspect="1"/>
+          </p:cNvPicPr>
+          <p:nvPr/>
+        </p:nvPicPr>
+        <p:blipFill>
+          <a:blip r:embed="rId3">
+            <a:extLst>
+              <a:ext uri="{96DAC541-7B7A-43D3-8B79-37D633B846F1}">
+                <asvg:svgBlip xmlns:asvg="http://schemas.microsoft.com/office/drawing/2016/SVG/main" r:embed="rId4"/>
+              </a:ext>
+            </a:extLst>
+          </a:blip>
+          <a:stretch>
+            <a:fillRect/>
+          </a:stretch>
+        </p:blipFill>
+        <p:spPr>
+          <a:xfrm>
+            <a:off x="352295" y="4835857"/>
+            <a:ext cx="1758286" cy="1758286"/>
+          </a:xfrm>
+          <a:prstGeom prst="rect">
+            <a:avLst/>
+          </a:prstGeom>
+        </p:spPr>
+      </p:pic>
+      <p:pic>
+        <p:nvPicPr>
+          <p:cNvPr id="7" name="Graphic 6" descr="Box outline">
+            <a:extLst>
+              <a:ext uri="{FF2B5EF4-FFF2-40B4-BE49-F238E27FC236}">
+                <a16:creationId xmlns:a16="http://schemas.microsoft.com/office/drawing/2014/main" id="{E41B2674-4DBE-F7CE-1EDA-FE947DA2AC24}"/>
+              </a:ext>
+            </a:extLst>
+          </p:cNvPr>
+          <p:cNvPicPr>
+            <a:picLocks noChangeAspect="1"/>
+          </p:cNvPicPr>
+          <p:nvPr/>
+        </p:nvPicPr>
+        <p:blipFill>
+          <a:blip r:embed="rId5">
+            <a:extLst>
+              <a:ext uri="{96DAC541-7B7A-43D3-8B79-37D633B846F1}">
+                <asvg:svgBlip xmlns:asvg="http://schemas.microsoft.com/office/drawing/2016/SVG/main" r:embed="rId6"/>
+              </a:ext>
+            </a:extLst>
+          </a:blip>
+          <a:stretch>
+            <a:fillRect/>
+          </a:stretch>
+        </p:blipFill>
+        <p:spPr>
+          <a:xfrm>
+            <a:off x="10081418" y="4889310"/>
+            <a:ext cx="1651379" cy="1651379"/>
+          </a:xfrm>
+          <a:prstGeom prst="rect">
+            <a:avLst/>
+          </a:prstGeom>
+        </p:spPr>
+      </p:pic>
+      <p:pic>
+        <p:nvPicPr>
+          <p:cNvPr id="9" name="Graphic 8" descr="Blockchain outline">
+            <a:extLst>
+              <a:ext uri="{FF2B5EF4-FFF2-40B4-BE49-F238E27FC236}">
+                <a16:creationId xmlns:a16="http://schemas.microsoft.com/office/drawing/2014/main" id="{81797219-1820-EE4D-B66E-1AD86B17E390}"/>
+              </a:ext>
+            </a:extLst>
+          </p:cNvPr>
+          <p:cNvPicPr>
+            <a:picLocks noChangeAspect="1"/>
+          </p:cNvPicPr>
+          <p:nvPr/>
+        </p:nvPicPr>
+        <p:blipFill>
+          <a:blip r:embed="rId7">
+            <a:extLst>
+              <a:ext uri="{96DAC541-7B7A-43D3-8B79-37D633B846F1}">
+                <asvg:svgBlip xmlns:asvg="http://schemas.microsoft.com/office/drawing/2016/SVG/main" r:embed="rId8"/>
+              </a:ext>
+            </a:extLst>
+          </a:blip>
+          <a:stretch>
+            <a:fillRect/>
+          </a:stretch>
+        </p:blipFill>
+        <p:spPr>
+          <a:xfrm>
+            <a:off x="10224719" y="317311"/>
+            <a:ext cx="1364776" cy="1364776"/>
+          </a:xfrm>
+          <a:prstGeom prst="rect">
+            <a:avLst/>
+          </a:prstGeom>
+        </p:spPr>
+      </p:pic>
+    </p:spTree>
+    <p:extLst>
+      <p:ext uri="{BB962C8B-B14F-4D97-AF65-F5344CB8AC3E}">
+        <p14:creationId xmlns:p14="http://schemas.microsoft.com/office/powerpoint/2010/main" val="3534669576"/>
+      </p:ext>
+    </p:extLst>
+  </p:cSld>
+  <p:clrMapOvr>
+    <a:masterClrMapping/>
+  </p:clrMapOvr>
+  <mc:AlternateContent xmlns:mc="http://schemas.openxmlformats.org/markup-compatibility/2006">
+    <mc:Choice xmlns:p15="http://schemas.microsoft.com/office/powerpoint/2012/main" Requires="p15">
+      <p:transition xmlns:p14="http://schemas.microsoft.com/office/powerpoint/2010/main" spd="slow" p14:dur="3250">
+        <p15:prstTrans prst="origami"/>
+      </p:transition>
+    </mc:Choice>
+    <mc:Fallback>
+      <p:transition spd="slow">
+        <p:fade/>
+      </p:transition>
+    </mc:Fallback>
+  </mc:AlternateContent>
+</p:sld>
+</file>
+
 <file path=ppt/slides/slide2.xml><?xml version="1.0" encoding="utf-8"?>
+<p:sld xmlns:a="http://schemas.openxmlformats.org/drawingml/2006/main" xmlns:r="http://schemas.openxmlformats.org/officeDocument/2006/relationships" xmlns:p="http://schemas.openxmlformats.org/presentationml/2006/main">
+  <p:cSld>
+    <p:spTree>
+      <p:nvGrpSpPr>
+        <p:cNvPr id="1" name="">
+          <a:extLst>
+            <a:ext uri="{FF2B5EF4-FFF2-40B4-BE49-F238E27FC236}">
+              <a16:creationId xmlns:a16="http://schemas.microsoft.com/office/drawing/2014/main" id="{2F86E62A-A3FC-33B7-2574-68F3F9365392}"/>
+            </a:ext>
+          </a:extLst>
+        </p:cNvPr>
+        <p:cNvGrpSpPr/>
+        <p:nvPr/>
+      </p:nvGrpSpPr>
+      <p:grpSpPr>
+        <a:xfrm>
+          <a:off x="0" y="0"/>
+          <a:ext cx="0" cy="0"/>
+          <a:chOff x="0" y="0"/>
+          <a:chExt cx="0" cy="0"/>
+        </a:xfrm>
+      </p:grpSpPr>
+      <p:sp>
+        <p:nvSpPr>
+          <p:cNvPr id="7" name="Title 1">
+            <a:extLst>
+              <a:ext uri="{FF2B5EF4-FFF2-40B4-BE49-F238E27FC236}">
+                <a16:creationId xmlns:a16="http://schemas.microsoft.com/office/drawing/2014/main" id="{C8C195E9-412D-EF67-D2F1-259CAC3B263A}"/>
+              </a:ext>
+            </a:extLst>
+          </p:cNvPr>
+          <p:cNvSpPr txBox="1">
+            <a:spLocks/>
+          </p:cNvSpPr>
+          <p:nvPr/>
+        </p:nvSpPr>
+        <p:spPr>
+          <a:xfrm>
+            <a:off x="618013" y="2073322"/>
+            <a:ext cx="10605675" cy="614150"/>
+          </a:xfrm>
+          <a:prstGeom prst="rect">
+            <a:avLst/>
+          </a:prstGeom>
+        </p:spPr>
+        <p:txBody>
+          <a:bodyPr vert="horz" lIns="91440" tIns="45720" rIns="91440" bIns="45720" rtlCol="0" anchor="t">
+            <a:normAutofit/>
+          </a:bodyPr>
+          <a:lstStyle>
+            <a:lvl1pPr algn="l" defTabSz="914400" rtl="0" eaLnBrk="1" latinLnBrk="0" hangingPunct="1">
+              <a:lnSpc>
+                <a:spcPct val="100000"/>
+              </a:lnSpc>
+              <a:spcBef>
+                <a:spcPct val="0"/>
+              </a:spcBef>
+              <a:buNone/>
+              <a:defRPr sz="5400" b="1" kern="1200">
+                <a:solidFill>
+                  <a:schemeClr val="tx1"/>
+                </a:solidFill>
+                <a:latin typeface="+mj-lt"/>
+                <a:ea typeface="+mj-ea"/>
+                <a:cs typeface="+mj-cs"/>
+              </a:defRPr>
+            </a:lvl1pPr>
+          </a:lstStyle>
+          <a:p>
+            <a:r>
+              <a:rPr lang="en-US" sz="2400" dirty="0"/>
+              <a:t>- Recent University At Buffalo graduate with a BS degree in Computer Science</a:t>
+            </a:r>
+          </a:p>
+        </p:txBody>
+      </p:sp>
+      <p:sp>
+        <p:nvSpPr>
+          <p:cNvPr id="8" name="Title 1">
+            <a:extLst>
+              <a:ext uri="{FF2B5EF4-FFF2-40B4-BE49-F238E27FC236}">
+                <a16:creationId xmlns:a16="http://schemas.microsoft.com/office/drawing/2014/main" id="{75A58736-A858-DBFA-FD9C-D09573693F9F}"/>
+              </a:ext>
+            </a:extLst>
+          </p:cNvPr>
+          <p:cNvSpPr txBox="1">
+            <a:spLocks/>
+          </p:cNvSpPr>
+          <p:nvPr/>
+        </p:nvSpPr>
+        <p:spPr>
+          <a:xfrm>
+            <a:off x="618010" y="2813882"/>
+            <a:ext cx="10605675" cy="614150"/>
+          </a:xfrm>
+          <a:prstGeom prst="rect">
+            <a:avLst/>
+          </a:prstGeom>
+        </p:spPr>
+        <p:txBody>
+          <a:bodyPr vert="horz" lIns="91440" tIns="45720" rIns="91440" bIns="45720" rtlCol="0" anchor="t">
+            <a:normAutofit/>
+          </a:bodyPr>
+          <a:lstStyle>
+            <a:lvl1pPr algn="l" defTabSz="914400" rtl="0" eaLnBrk="1" latinLnBrk="0" hangingPunct="1">
+              <a:lnSpc>
+                <a:spcPct val="100000"/>
+              </a:lnSpc>
+              <a:spcBef>
+                <a:spcPct val="0"/>
+              </a:spcBef>
+              <a:buNone/>
+              <a:defRPr sz="5400" b="1" kern="1200">
+                <a:solidFill>
+                  <a:schemeClr val="tx1"/>
+                </a:solidFill>
+                <a:latin typeface="+mj-lt"/>
+                <a:ea typeface="+mj-ea"/>
+                <a:cs typeface="+mj-cs"/>
+              </a:defRPr>
+            </a:lvl1pPr>
+          </a:lstStyle>
+          <a:p>
+            <a:r>
+              <a:rPr lang="en-US" sz="2400" dirty="0"/>
+              <a:t>- Form IT Intern at Woodhull Hospital in NYC</a:t>
+            </a:r>
+          </a:p>
+          <a:p>
+            <a:endParaRPr lang="en-US" sz="2400" dirty="0"/>
+          </a:p>
+        </p:txBody>
+      </p:sp>
+      <p:sp>
+        <p:nvSpPr>
+          <p:cNvPr id="10" name="Title 1">
+            <a:extLst>
+              <a:ext uri="{FF2B5EF4-FFF2-40B4-BE49-F238E27FC236}">
+                <a16:creationId xmlns:a16="http://schemas.microsoft.com/office/drawing/2014/main" id="{5532330B-9329-F0A0-0703-9615FDBB9FFA}"/>
+              </a:ext>
+            </a:extLst>
+          </p:cNvPr>
+          <p:cNvSpPr txBox="1">
+            <a:spLocks/>
+          </p:cNvSpPr>
+          <p:nvPr/>
+        </p:nvSpPr>
+        <p:spPr>
+          <a:xfrm>
+            <a:off x="618014" y="1177120"/>
+            <a:ext cx="10605675" cy="614150"/>
+          </a:xfrm>
+          <a:prstGeom prst="rect">
+            <a:avLst/>
+          </a:prstGeom>
+        </p:spPr>
+        <p:txBody>
+          <a:bodyPr vert="horz" lIns="91440" tIns="45720" rIns="91440" bIns="45720" rtlCol="0" anchor="t">
+            <a:normAutofit/>
+          </a:bodyPr>
+          <a:lstStyle>
+            <a:lvl1pPr algn="l" defTabSz="914400" rtl="0" eaLnBrk="1" latinLnBrk="0" hangingPunct="1">
+              <a:lnSpc>
+                <a:spcPct val="100000"/>
+              </a:lnSpc>
+              <a:spcBef>
+                <a:spcPct val="0"/>
+              </a:spcBef>
+              <a:buNone/>
+              <a:defRPr sz="5400" b="1" kern="1200">
+                <a:solidFill>
+                  <a:schemeClr val="tx1"/>
+                </a:solidFill>
+                <a:latin typeface="+mj-lt"/>
+                <a:ea typeface="+mj-ea"/>
+                <a:cs typeface="+mj-cs"/>
+              </a:defRPr>
+            </a:lvl1pPr>
+          </a:lstStyle>
+          <a:p>
+            <a:r>
+              <a:rPr lang="en-US" sz="3200" dirty="0"/>
+              <a:t>About me</a:t>
+            </a:r>
+          </a:p>
+        </p:txBody>
+      </p:sp>
+      <p:sp>
+        <p:nvSpPr>
+          <p:cNvPr id="2" name="Title 1">
+            <a:extLst>
+              <a:ext uri="{FF2B5EF4-FFF2-40B4-BE49-F238E27FC236}">
+                <a16:creationId xmlns:a16="http://schemas.microsoft.com/office/drawing/2014/main" id="{0CD6E89B-373C-9A35-F9D7-F1AFF140DFCC}"/>
+              </a:ext>
+            </a:extLst>
+          </p:cNvPr>
+          <p:cNvSpPr txBox="1">
+            <a:spLocks/>
+          </p:cNvSpPr>
+          <p:nvPr/>
+        </p:nvSpPr>
+        <p:spPr>
+          <a:xfrm>
+            <a:off x="618011" y="3565475"/>
+            <a:ext cx="10767536" cy="513026"/>
+          </a:xfrm>
+          <a:prstGeom prst="rect">
+            <a:avLst/>
+          </a:prstGeom>
+        </p:spPr>
+        <p:txBody>
+          <a:bodyPr vert="horz" lIns="91440" tIns="45720" rIns="91440" bIns="45720" rtlCol="0" anchor="t">
+            <a:normAutofit/>
+          </a:bodyPr>
+          <a:lstStyle>
+            <a:lvl1pPr algn="l" defTabSz="914400" rtl="0" eaLnBrk="1" latinLnBrk="0" hangingPunct="1">
+              <a:lnSpc>
+                <a:spcPct val="100000"/>
+              </a:lnSpc>
+              <a:spcBef>
+                <a:spcPct val="0"/>
+              </a:spcBef>
+              <a:buNone/>
+              <a:defRPr sz="5400" b="1" kern="1200">
+                <a:solidFill>
+                  <a:schemeClr val="tx1"/>
+                </a:solidFill>
+                <a:latin typeface="+mj-lt"/>
+                <a:ea typeface="+mj-ea"/>
+                <a:cs typeface="+mj-cs"/>
+              </a:defRPr>
+            </a:lvl1pPr>
+          </a:lstStyle>
+          <a:p>
+            <a:r>
+              <a:rPr lang="en-US" sz="2400" dirty="0"/>
+              <a:t>- Personal Projects in Full-Stack Web Development</a:t>
+            </a:r>
+            <a:endParaRPr lang="en-US" sz="100" dirty="0"/>
+          </a:p>
+        </p:txBody>
+      </p:sp>
+      <p:sp>
+        <p:nvSpPr>
+          <p:cNvPr id="9" name="Title 1">
+            <a:extLst>
+              <a:ext uri="{FF2B5EF4-FFF2-40B4-BE49-F238E27FC236}">
+                <a16:creationId xmlns:a16="http://schemas.microsoft.com/office/drawing/2014/main" id="{E1ABEA00-CBD6-A6A4-C611-2D9CC5076B73}"/>
+              </a:ext>
+            </a:extLst>
+          </p:cNvPr>
+          <p:cNvSpPr txBox="1">
+            <a:spLocks/>
+          </p:cNvSpPr>
+          <p:nvPr/>
+        </p:nvSpPr>
+        <p:spPr>
+          <a:xfrm>
+            <a:off x="618010" y="5008532"/>
+            <a:ext cx="10605675" cy="797451"/>
+          </a:xfrm>
+          <a:prstGeom prst="rect">
+            <a:avLst/>
+          </a:prstGeom>
+        </p:spPr>
+        <p:txBody>
+          <a:bodyPr vert="horz" lIns="91440" tIns="45720" rIns="91440" bIns="45720" rtlCol="0" anchor="t">
+            <a:normAutofit lnSpcReduction="10000"/>
+          </a:bodyPr>
+          <a:lstStyle>
+            <a:lvl1pPr algn="l" defTabSz="914400" rtl="0" eaLnBrk="1" latinLnBrk="0" hangingPunct="1">
+              <a:lnSpc>
+                <a:spcPct val="100000"/>
+              </a:lnSpc>
+              <a:spcBef>
+                <a:spcPct val="0"/>
+              </a:spcBef>
+              <a:buNone/>
+              <a:defRPr sz="5400" b="1" kern="1200">
+                <a:solidFill>
+                  <a:schemeClr val="tx1"/>
+                </a:solidFill>
+                <a:latin typeface="+mj-lt"/>
+                <a:ea typeface="+mj-ea"/>
+                <a:cs typeface="+mj-cs"/>
+              </a:defRPr>
+            </a:lvl1pPr>
+          </a:lstStyle>
+          <a:p>
+            <a:r>
+              <a:rPr lang="en-US" sz="2400" dirty="0"/>
+              <a:t>- Being in an innovative environment and challenging</a:t>
+            </a:r>
+            <a:br>
+              <a:rPr lang="en-US" sz="2400" dirty="0"/>
+            </a:br>
+            <a:r>
+              <a:rPr lang="en-US" sz="2400" dirty="0"/>
+              <a:t>   myself by building software to simplify the lives of others </a:t>
+            </a:r>
+          </a:p>
+          <a:p>
+            <a:endParaRPr lang="en-US" sz="2400" dirty="0"/>
+          </a:p>
+        </p:txBody>
+      </p:sp>
+      <p:pic>
+        <p:nvPicPr>
+          <p:cNvPr id="12" name="Graphic 11" descr="Male profile with solid fill">
+            <a:extLst>
+              <a:ext uri="{FF2B5EF4-FFF2-40B4-BE49-F238E27FC236}">
+                <a16:creationId xmlns:a16="http://schemas.microsoft.com/office/drawing/2014/main" id="{648B6932-BD43-D02B-4E09-5186ACEC52C7}"/>
+              </a:ext>
+            </a:extLst>
+          </p:cNvPr>
+          <p:cNvPicPr>
+            <a:picLocks noChangeAspect="1"/>
+          </p:cNvPicPr>
+          <p:nvPr/>
+        </p:nvPicPr>
+        <p:blipFill>
+          <a:blip r:embed="rId2">
+            <a:extLst>
+              <a:ext uri="{96DAC541-7B7A-43D3-8B79-37D633B846F1}">
+                <asvg:svgBlip xmlns:asvg="http://schemas.microsoft.com/office/drawing/2016/SVG/main" r:embed="rId3"/>
+              </a:ext>
+            </a:extLst>
+          </a:blip>
+          <a:stretch>
+            <a:fillRect/>
+          </a:stretch>
+        </p:blipFill>
+        <p:spPr>
+          <a:xfrm>
+            <a:off x="2533650" y="895068"/>
+            <a:ext cx="914400" cy="914400"/>
+          </a:xfrm>
+          <a:prstGeom prst="rect">
+            <a:avLst/>
+          </a:prstGeom>
+        </p:spPr>
+      </p:pic>
+      <p:pic>
+        <p:nvPicPr>
+          <p:cNvPr id="14" name="Picture 13" descr="A person sitting on a stone wall by water&#10;&#10;AI-generated content may be incorrect.">
+            <a:extLst>
+              <a:ext uri="{FF2B5EF4-FFF2-40B4-BE49-F238E27FC236}">
+                <a16:creationId xmlns:a16="http://schemas.microsoft.com/office/drawing/2014/main" id="{532870B7-83A1-FD3F-134F-C4FBEA118005}"/>
+              </a:ext>
+            </a:extLst>
+          </p:cNvPr>
+          <p:cNvPicPr>
+            <a:picLocks noChangeAspect="1"/>
+          </p:cNvPicPr>
+          <p:nvPr/>
+        </p:nvPicPr>
+        <p:blipFill>
+          <a:blip r:embed="rId4">
+            <a:extLst>
+              <a:ext uri="{28A0092B-C50C-407E-A947-70E740481C1C}">
+                <a14:useLocalDpi xmlns:a14="http://schemas.microsoft.com/office/drawing/2010/main" val="0"/>
+              </a:ext>
+            </a:extLst>
+          </a:blip>
+          <a:stretch>
+            <a:fillRect/>
+          </a:stretch>
+        </p:blipFill>
+        <p:spPr>
+          <a:xfrm>
+            <a:off x="8801097" y="2882604"/>
+            <a:ext cx="2062723" cy="2062723"/>
+          </a:xfrm>
+          <a:prstGeom prst="rect">
+            <a:avLst/>
+          </a:prstGeom>
+        </p:spPr>
+      </p:pic>
+      <p:sp>
+        <p:nvSpPr>
+          <p:cNvPr id="15" name="Title 1">
+            <a:extLst>
+              <a:ext uri="{FF2B5EF4-FFF2-40B4-BE49-F238E27FC236}">
+                <a16:creationId xmlns:a16="http://schemas.microsoft.com/office/drawing/2014/main" id="{A2A2247B-5B04-A37B-04C3-91B87044EFEF}"/>
+              </a:ext>
+            </a:extLst>
+          </p:cNvPr>
+          <p:cNvSpPr txBox="1">
+            <a:spLocks/>
+          </p:cNvSpPr>
+          <p:nvPr/>
+        </p:nvSpPr>
+        <p:spPr>
+          <a:xfrm>
+            <a:off x="618010" y="4287003"/>
+            <a:ext cx="10767536" cy="513026"/>
+          </a:xfrm>
+          <a:prstGeom prst="rect">
+            <a:avLst/>
+          </a:prstGeom>
+        </p:spPr>
+        <p:txBody>
+          <a:bodyPr vert="horz" lIns="91440" tIns="45720" rIns="91440" bIns="45720" rtlCol="0" anchor="t">
+            <a:normAutofit/>
+          </a:bodyPr>
+          <a:lstStyle>
+            <a:lvl1pPr algn="l" defTabSz="914400" rtl="0" eaLnBrk="1" latinLnBrk="0" hangingPunct="1">
+              <a:lnSpc>
+                <a:spcPct val="100000"/>
+              </a:lnSpc>
+              <a:spcBef>
+                <a:spcPct val="0"/>
+              </a:spcBef>
+              <a:buNone/>
+              <a:defRPr sz="5400" b="1" kern="1200">
+                <a:solidFill>
+                  <a:schemeClr val="tx1"/>
+                </a:solidFill>
+                <a:latin typeface="+mj-lt"/>
+                <a:ea typeface="+mj-ea"/>
+                <a:cs typeface="+mj-cs"/>
+              </a:defRPr>
+            </a:lvl1pPr>
+          </a:lstStyle>
+          <a:p>
+            <a:r>
+              <a:rPr lang="en-US" sz="2400" dirty="0"/>
+              <a:t>- Interest in Data Engineering</a:t>
+            </a:r>
+            <a:endParaRPr lang="en-US" sz="100" dirty="0"/>
+          </a:p>
+        </p:txBody>
+      </p:sp>
+      <p:sp>
+        <p:nvSpPr>
+          <p:cNvPr id="16" name="Title 1">
+            <a:extLst>
+              <a:ext uri="{FF2B5EF4-FFF2-40B4-BE49-F238E27FC236}">
+                <a16:creationId xmlns:a16="http://schemas.microsoft.com/office/drawing/2014/main" id="{894E1D93-E5CB-DADE-A68C-76970C8FB867}"/>
+              </a:ext>
+            </a:extLst>
+          </p:cNvPr>
+          <p:cNvSpPr txBox="1">
+            <a:spLocks/>
+          </p:cNvSpPr>
+          <p:nvPr/>
+        </p:nvSpPr>
+        <p:spPr>
+          <a:xfrm>
+            <a:off x="618010" y="5932393"/>
+            <a:ext cx="10767536" cy="513026"/>
+          </a:xfrm>
+          <a:prstGeom prst="rect">
+            <a:avLst/>
+          </a:prstGeom>
+        </p:spPr>
+        <p:txBody>
+          <a:bodyPr vert="horz" lIns="91440" tIns="45720" rIns="91440" bIns="45720" rtlCol="0" anchor="t">
+            <a:normAutofit/>
+          </a:bodyPr>
+          <a:lstStyle>
+            <a:lvl1pPr algn="l" defTabSz="914400" rtl="0" eaLnBrk="1" latinLnBrk="0" hangingPunct="1">
+              <a:lnSpc>
+                <a:spcPct val="100000"/>
+              </a:lnSpc>
+              <a:spcBef>
+                <a:spcPct val="0"/>
+              </a:spcBef>
+              <a:buNone/>
+              <a:defRPr sz="5400" b="1" kern="1200">
+                <a:solidFill>
+                  <a:schemeClr val="tx1"/>
+                </a:solidFill>
+                <a:latin typeface="+mj-lt"/>
+                <a:ea typeface="+mj-ea"/>
+                <a:cs typeface="+mj-cs"/>
+              </a:defRPr>
+            </a:lvl1pPr>
+          </a:lstStyle>
+          <a:p>
+            <a:r>
+              <a:rPr lang="en-US" sz="2400" dirty="0"/>
+              <a:t>- Personal hobbies: Recreational Sports, Traveling, Gaming</a:t>
+            </a:r>
+            <a:endParaRPr lang="en-US" sz="100" dirty="0"/>
+          </a:p>
+        </p:txBody>
+      </p:sp>
+    </p:spTree>
+    <p:extLst>
+      <p:ext uri="{BB962C8B-B14F-4D97-AF65-F5344CB8AC3E}">
+        <p14:creationId xmlns:p14="http://schemas.microsoft.com/office/powerpoint/2010/main" val="1122895534"/>
+      </p:ext>
+    </p:extLst>
+  </p:cSld>
+  <p:clrMapOvr>
+    <a:masterClrMapping/>
+  </p:clrMapOvr>
+  <mc:AlternateContent xmlns:mc="http://schemas.openxmlformats.org/markup-compatibility/2006">
+    <mc:Choice xmlns:p15="http://schemas.microsoft.com/office/powerpoint/2012/main" Requires="p15">
+      <p:transition xmlns:p14="http://schemas.microsoft.com/office/powerpoint/2010/main" spd="slow" p14:dur="1250">
+        <p15:prstTrans prst="pageCurlDouble"/>
+      </p:transition>
+    </mc:Choice>
+    <mc:Fallback>
+      <p:transition spd="slow">
+        <p:fade/>
+      </p:transition>
+    </mc:Fallback>
+  </mc:AlternateContent>
+</p:sld>
+</file>
+
+<file path=ppt/slides/slide3.xml><?xml version="1.0" encoding="utf-8"?>
 <p:sld xmlns:a="http://schemas.openxmlformats.org/drawingml/2006/main" xmlns:r="http://schemas.openxmlformats.org/officeDocument/2006/relationships" xmlns:p="http://schemas.openxmlformats.org/presentationml/2006/main">
   <p:cSld>
     <p:spTree>
@@ -1682,7 +2714,7 @@
           <a:p>
             <a:r>
               <a:rPr lang="en-US" sz="3200" dirty="0"/>
-              <a:t>Goals for my project:</a:t>
+              <a:t>Goals for my project</a:t>
             </a:r>
           </a:p>
         </p:txBody>
@@ -1841,13 +2873,13 @@
   <p:clrMapOvr>
     <a:masterClrMapping/>
   </p:clrMapOvr>
-  <mc:AlternateContent xmlns:mc="http://schemas.openxmlformats.org/markup-compatibility/2006">
-    <mc:Choice xmlns:p15="http://schemas.microsoft.com/office/powerpoint/2012/main" Requires="p15">
+  <mc:AlternateContent xmlns:mc="http://schemas.openxmlformats.org/markup-compatibility/2006" xmlns:p15="http://schemas.microsoft.com/office/powerpoint/2012/main">
+    <mc:Choice Requires="p15">
       <p:transition xmlns:p14="http://schemas.microsoft.com/office/powerpoint/2010/main" spd="slow" p14:dur="6000">
         <p15:prstTrans prst="curtains"/>
       </p:transition>
     </mc:Choice>
-    <mc:Fallback>
+    <mc:Fallback xmlns="">
       <p:transition spd="slow">
         <p:fade/>
       </p:transition>
@@ -1856,7 +2888,7 @@
 </p:sld>
 </file>
 
-<file path=ppt/slides/slide3.xml><?xml version="1.0" encoding="utf-8"?>
+<file path=ppt/slides/slide4.xml><?xml version="1.0" encoding="utf-8"?>
 <p:sld xmlns:a="http://schemas.openxmlformats.org/drawingml/2006/main" xmlns:r="http://schemas.openxmlformats.org/officeDocument/2006/relationships" xmlns:p="http://schemas.openxmlformats.org/presentationml/2006/main">
   <p:cSld>
     <p:spTree>
@@ -1909,7 +2941,7 @@
           <a:p>
             <a:r>
               <a:rPr lang="en-US" sz="2400" dirty="0"/>
-              <a:t>Dataset Used for Machine Learning and Financial ETL</a:t>
+              <a:t>Datasets Used for Machine Learning and Financial ETL</a:t>
             </a:r>
           </a:p>
         </p:txBody>
@@ -2037,7 +3069,7 @@
             <a:pPr algn="ctr"/>
             <a:r>
               <a:rPr lang="en-US" b="1" u="sng" dirty="0"/>
-              <a:t>Datasets used:</a:t>
+              <a:t>Datasets used from dolthub.com:</a:t>
             </a:r>
           </a:p>
           <a:p>
@@ -2187,7 +3219,7 @@
         </p:blipFill>
         <p:spPr>
           <a:xfrm>
-            <a:off x="1917638" y="2021814"/>
+            <a:off x="1047750" y="2021814"/>
             <a:ext cx="539811" cy="539811"/>
           </a:xfrm>
           <a:prstGeom prst="rect">
@@ -2205,13 +3237,13 @@
   <p:clrMapOvr>
     <a:masterClrMapping/>
   </p:clrMapOvr>
-  <mc:AlternateContent xmlns:mc="http://schemas.openxmlformats.org/markup-compatibility/2006">
-    <mc:Choice xmlns:p15="http://schemas.microsoft.com/office/powerpoint/2012/main" Requires="p15">
+  <mc:AlternateContent xmlns:mc="http://schemas.openxmlformats.org/markup-compatibility/2006" xmlns:p15="http://schemas.microsoft.com/office/powerpoint/2012/main">
+    <mc:Choice Requires="p15">
       <p:transition xmlns:p14="http://schemas.microsoft.com/office/powerpoint/2010/main" spd="slow" p14:dur="2000">
         <p15:prstTrans prst="wind"/>
       </p:transition>
     </mc:Choice>
-    <mc:Fallback>
+    <mc:Fallback xmlns="">
       <p:transition spd="slow">
         <p:fade/>
       </p:transition>
@@ -2220,7 +3252,7 @@
 </p:sld>
 </file>
 
-<file path=ppt/slides/slide4.xml><?xml version="1.0" encoding="utf-8"?>
+<file path=ppt/slides/slide5.xml><?xml version="1.0" encoding="utf-8"?>
 <p:sld xmlns:a="http://schemas.openxmlformats.org/drawingml/2006/main" xmlns:r="http://schemas.openxmlformats.org/officeDocument/2006/relationships" xmlns:p="http://schemas.openxmlformats.org/presentationml/2006/main">
   <p:cSld>
     <p:spTree>
@@ -2690,13 +3722,13 @@
   <p:clrMapOvr>
     <a:masterClrMapping/>
   </p:clrMapOvr>
-  <mc:AlternateContent xmlns:mc="http://schemas.openxmlformats.org/markup-compatibility/2006">
-    <mc:Choice xmlns:p15="http://schemas.microsoft.com/office/powerpoint/2012/main" Requires="p15">
+  <mc:AlternateContent xmlns:mc="http://schemas.openxmlformats.org/markup-compatibility/2006" xmlns:p15="http://schemas.microsoft.com/office/powerpoint/2012/main">
+    <mc:Choice Requires="p15">
       <p:transition xmlns:p14="http://schemas.microsoft.com/office/powerpoint/2010/main" spd="slow" p14:dur="2000">
         <p15:prstTrans prst="prestige"/>
       </p:transition>
     </mc:Choice>
-    <mc:Fallback>
+    <mc:Fallback xmlns="">
       <p:transition spd="slow">
         <p:fade/>
       </p:transition>
@@ -2705,7 +3737,7 @@
 </p:sld>
 </file>
 
-<file path=ppt/slides/slide5.xml><?xml version="1.0" encoding="utf-8"?>
+<file path=ppt/slides/slide6.xml><?xml version="1.0" encoding="utf-8"?>
 <p:sld xmlns:a="http://schemas.openxmlformats.org/drawingml/2006/main" xmlns:r="http://schemas.openxmlformats.org/officeDocument/2006/relationships" xmlns:p="http://schemas.openxmlformats.org/presentationml/2006/main">
   <p:cSld>
     <p:spTree>
@@ -2960,7 +3992,7 @@
             <a:pPr algn="ctr"/>
             <a:r>
               <a:rPr lang="en-US" sz="2400" dirty="0"/>
-              <a:t>Machine Learning Conclusive Results: </a:t>
+              <a:t>Machine Learning Results </a:t>
             </a:r>
             <a:br>
               <a:rPr lang="en-US" sz="2400" dirty="0"/>
@@ -2995,13 +4027,13 @@
   <p:clrMapOvr>
     <a:masterClrMapping/>
   </p:clrMapOvr>
-  <mc:AlternateContent xmlns:mc="http://schemas.openxmlformats.org/markup-compatibility/2006">
-    <mc:Choice xmlns:p15="http://schemas.microsoft.com/office/powerpoint/2012/main" Requires="p15">
+  <mc:AlternateContent xmlns:mc="http://schemas.openxmlformats.org/markup-compatibility/2006" xmlns:p15="http://schemas.microsoft.com/office/powerpoint/2012/main">
+    <mc:Choice Requires="p15">
       <p:transition xmlns:p14="http://schemas.microsoft.com/office/powerpoint/2010/main" spd="slow" p14:dur="2000">
         <p15:prstTrans prst="crush"/>
       </p:transition>
     </mc:Choice>
-    <mc:Fallback>
+    <mc:Fallback xmlns="">
       <p:transition spd="slow">
         <p:fade/>
       </p:transition>
@@ -3010,7 +4042,7 @@
 </p:sld>
 </file>
 
-<file path=ppt/slides/slide6.xml><?xml version="1.0" encoding="utf-8"?>
+<file path=ppt/slides/slide7.xml><?xml version="1.0" encoding="utf-8"?>
 <p:sld xmlns:a="http://schemas.openxmlformats.org/drawingml/2006/main" xmlns:r="http://schemas.openxmlformats.org/officeDocument/2006/relationships" xmlns:p="http://schemas.openxmlformats.org/presentationml/2006/main">
   <p:cSld>
     <p:spTree>
@@ -3324,13 +4356,13 @@
   <p:clrMapOvr>
     <a:masterClrMapping/>
   </p:clrMapOvr>
-  <mc:AlternateContent xmlns:mc="http://schemas.openxmlformats.org/markup-compatibility/2006">
-    <mc:Choice xmlns:p15="http://schemas.microsoft.com/office/powerpoint/2012/main" Requires="p15">
+  <mc:AlternateContent xmlns:mc="http://schemas.openxmlformats.org/markup-compatibility/2006" xmlns:p15="http://schemas.microsoft.com/office/powerpoint/2012/main">
+    <mc:Choice Requires="p15">
       <p:transition xmlns:p14="http://schemas.microsoft.com/office/powerpoint/2010/main" spd="slow" p14:dur="2000">
         <p15:prstTrans prst="fracture"/>
       </p:transition>
     </mc:Choice>
-    <mc:Fallback>
+    <mc:Fallback xmlns="">
       <p:transition spd="slow">
         <p:fade/>
       </p:transition>
@@ -3339,7 +4371,7 @@
 </p:sld>
 </file>
 
-<file path=ppt/slides/slide7.xml><?xml version="1.0" encoding="utf-8"?>
+<file path=ppt/slides/slide8.xml><?xml version="1.0" encoding="utf-8"?>
 <p:sld xmlns:a="http://schemas.openxmlformats.org/drawingml/2006/main" xmlns:r="http://schemas.openxmlformats.org/officeDocument/2006/relationships" xmlns:p="http://schemas.openxmlformats.org/presentationml/2006/main">
   <p:cSld>
     <p:spTree>
@@ -3556,10 +4588,9 @@
           </a:lstStyle>
           <a:p>
             <a:r>
-              <a:rPr lang="en-US" sz="2400"/>
+              <a:rPr lang="en-US" sz="2400" dirty="0"/>
               <a:t>How do I display it for data analysis?				Dash</a:t>
             </a:r>
-            <a:endParaRPr lang="en-US" sz="2400" dirty="0"/>
           </a:p>
         </p:txBody>
       </p:sp>
@@ -3705,7 +4736,7 @@
 </p:sld>
 </file>
 
-<file path=ppt/slides/slide8.xml><?xml version="1.0" encoding="utf-8"?>
+<file path=ppt/slides/slide9.xml><?xml version="1.0" encoding="utf-8"?>
 <p:sld xmlns:a="http://schemas.openxmlformats.org/drawingml/2006/main" xmlns:r="http://schemas.openxmlformats.org/officeDocument/2006/relationships" xmlns:p="http://schemas.openxmlformats.org/presentationml/2006/main">
   <p:cSld>
     <p:spTree>
@@ -3967,231 +4998,13 @@
   <p:clrMapOvr>
     <a:masterClrMapping/>
   </p:clrMapOvr>
-  <mc:AlternateContent xmlns:mc="http://schemas.openxmlformats.org/markup-compatibility/2006">
-    <mc:Choice xmlns:p15="http://schemas.microsoft.com/office/powerpoint/2012/main" Requires="p15">
+  <mc:AlternateContent xmlns:mc="http://schemas.openxmlformats.org/markup-compatibility/2006" xmlns:p15="http://schemas.microsoft.com/office/powerpoint/2012/main">
+    <mc:Choice Requires="p15">
       <p:transition xmlns:p14="http://schemas.microsoft.com/office/powerpoint/2010/main" spd="slow" p14:dur="2000">
         <p15:prstTrans prst="prestige"/>
       </p:transition>
     </mc:Choice>
-    <mc:Fallback>
-      <p:transition spd="slow">
-        <p:fade/>
-      </p:transition>
-    </mc:Fallback>
-  </mc:AlternateContent>
-</p:sld>
-</file>
-
-<file path=ppt/slides/slide9.xml><?xml version="1.0" encoding="utf-8"?>
-<p:sld xmlns:a="http://schemas.openxmlformats.org/drawingml/2006/main" xmlns:r="http://schemas.openxmlformats.org/officeDocument/2006/relationships" xmlns:p="http://schemas.openxmlformats.org/presentationml/2006/main">
-  <p:cSld>
-    <p:spTree>
-      <p:nvGrpSpPr>
-        <p:cNvPr id="1" name="">
-          <a:extLst>
-            <a:ext uri="{FF2B5EF4-FFF2-40B4-BE49-F238E27FC236}">
-              <a16:creationId xmlns:a16="http://schemas.microsoft.com/office/drawing/2014/main" id="{29E9DEE3-D995-A92B-C733-D20004C134AC}"/>
-            </a:ext>
-          </a:extLst>
-        </p:cNvPr>
-        <p:cNvGrpSpPr/>
-        <p:nvPr/>
-      </p:nvGrpSpPr>
-      <p:grpSpPr>
-        <a:xfrm>
-          <a:off x="0" y="0"/>
-          <a:ext cx="0" cy="0"/>
-          <a:chOff x="0" y="0"/>
-          <a:chExt cx="0" cy="0"/>
-        </a:xfrm>
-      </p:grpSpPr>
-      <p:sp>
-        <p:nvSpPr>
-          <p:cNvPr id="22" name="Title 1">
-            <a:extLst>
-              <a:ext uri="{FF2B5EF4-FFF2-40B4-BE49-F238E27FC236}">
-                <a16:creationId xmlns:a16="http://schemas.microsoft.com/office/drawing/2014/main" id="{51BCFCF0-7319-6925-A648-ED5D9EA2C53C}"/>
-              </a:ext>
-            </a:extLst>
-          </p:cNvPr>
-          <p:cNvSpPr txBox="1">
-            <a:spLocks noGrp="1"/>
-          </p:cNvSpPr>
-          <p:nvPr>
-            <p:ph type="ctrTitle"/>
-          </p:nvPr>
-        </p:nvSpPr>
-        <p:spPr>
-          <a:xfrm>
-            <a:off x="2110581" y="1549400"/>
-            <a:ext cx="7970837" cy="4165600"/>
-          </a:xfrm>
-          <a:prstGeom prst="rect">
-            <a:avLst/>
-          </a:prstGeom>
-        </p:spPr>
-        <p:txBody>
-          <a:bodyPr vert="horz" lIns="91440" tIns="45720" rIns="91440" bIns="45720" rtlCol="0" anchor="t">
-            <a:normAutofit/>
-          </a:bodyPr>
-          <a:lstStyle>
-            <a:lvl1pPr algn="l" defTabSz="914400" rtl="0" eaLnBrk="1" latinLnBrk="0" hangingPunct="1">
-              <a:lnSpc>
-                <a:spcPct val="100000"/>
-              </a:lnSpc>
-              <a:spcBef>
-                <a:spcPct val="0"/>
-              </a:spcBef>
-              <a:buNone/>
-              <a:defRPr sz="5400" b="1" kern="1200">
-                <a:solidFill>
-                  <a:schemeClr val="tx1"/>
-                </a:solidFill>
-                <a:latin typeface="+mj-lt"/>
-                <a:ea typeface="+mj-ea"/>
-                <a:cs typeface="+mj-cs"/>
-              </a:defRPr>
-            </a:lvl1pPr>
-          </a:lstStyle>
-          <a:p>
-            <a:pPr algn="ctr"/>
-            <a:r>
-              <a:rPr lang="en-US" sz="2400" dirty="0"/>
-              <a:t>ETL Conclusive Results:</a:t>
-            </a:r>
-            <a:br>
-              <a:rPr lang="en-US" sz="2400" dirty="0"/>
-            </a:br>
-            <a:br>
-              <a:rPr lang="en-US" sz="2400" dirty="0"/>
-            </a:br>
-            <a:r>
-              <a:rPr lang="en-US" sz="2400" b="0" u="sng" dirty="0"/>
-              <a:t>Company Key Metrics </a:t>
-            </a:r>
-            <a:br>
-              <a:rPr lang="en-US" sz="2400" b="0" dirty="0"/>
-            </a:br>
-            <a:r>
-              <a:rPr lang="en-US" sz="1800" b="0" dirty="0"/>
-              <a:t>Line Graphs of every companies Net Income, Sales, and Operating Income</a:t>
-            </a:r>
-            <a:br>
-              <a:rPr lang="en-US" sz="1800" b="0" dirty="0"/>
-            </a:br>
-            <a:br>
-              <a:rPr lang="en-US" sz="1800" b="0" dirty="0"/>
-            </a:br>
-            <a:r>
-              <a:rPr lang="en-US" sz="2400" b="0" u="sng" dirty="0"/>
-              <a:t>Multiple Company Comparison</a:t>
-            </a:r>
-            <a:br>
-              <a:rPr lang="en-US" sz="2400" b="0" dirty="0"/>
-            </a:br>
-            <a:r>
-              <a:rPr lang="en-US" sz="1800" b="0" dirty="0"/>
-              <a:t>Line Graphs of every companies Net Income, Sales, and Operating Income</a:t>
-            </a:r>
-            <a:br>
-              <a:rPr lang="en-US" sz="1800" b="0" dirty="0"/>
-            </a:br>
-            <a:br>
-              <a:rPr lang="en-US" sz="2400" b="0" dirty="0"/>
-            </a:br>
-            <a:r>
-              <a:rPr lang="en-US" sz="2400" b="0" dirty="0">
-                <a:hlinkClick r:id="rId2"/>
-              </a:rPr>
-              <a:t>Click to open Dash</a:t>
-            </a:r>
-            <a:endParaRPr lang="en-US" sz="2400" b="0" dirty="0"/>
-          </a:p>
-        </p:txBody>
-      </p:sp>
-      <p:pic>
-        <p:nvPicPr>
-          <p:cNvPr id="4" name="Picture 3">
-            <a:extLst>
-              <a:ext uri="{FF2B5EF4-FFF2-40B4-BE49-F238E27FC236}">
-                <a16:creationId xmlns:a16="http://schemas.microsoft.com/office/drawing/2014/main" id="{53F5F271-959D-DEF2-5F8A-9490C31B150A}"/>
-              </a:ext>
-            </a:extLst>
-          </p:cNvPr>
-          <p:cNvPicPr>
-            <a:picLocks noChangeAspect="1"/>
-          </p:cNvPicPr>
-          <p:nvPr/>
-        </p:nvPicPr>
-        <p:blipFill>
-          <a:blip r:embed="rId3"/>
-          <a:stretch>
-            <a:fillRect/>
-          </a:stretch>
-        </p:blipFill>
-        <p:spPr>
-          <a:xfrm>
-            <a:off x="653851" y="4312693"/>
-            <a:ext cx="2174669" cy="2180231"/>
-          </a:xfrm>
-          <a:prstGeom prst="rect">
-            <a:avLst/>
-          </a:prstGeom>
-        </p:spPr>
-      </p:pic>
-      <p:pic>
-        <p:nvPicPr>
-          <p:cNvPr id="6" name="Graphic 5" descr="Bar chart with solid fill">
-            <a:extLst>
-              <a:ext uri="{FF2B5EF4-FFF2-40B4-BE49-F238E27FC236}">
-                <a16:creationId xmlns:a16="http://schemas.microsoft.com/office/drawing/2014/main" id="{C75A9FAD-6C7F-6189-9547-934AE267F083}"/>
-              </a:ext>
-            </a:extLst>
-          </p:cNvPr>
-          <p:cNvPicPr>
-            <a:picLocks noChangeAspect="1"/>
-          </p:cNvPicPr>
-          <p:nvPr/>
-        </p:nvPicPr>
-        <p:blipFill>
-          <a:blip r:embed="rId4">
-            <a:extLst>
-              <a:ext uri="{96DAC541-7B7A-43D3-8B79-37D633B846F1}">
-                <asvg:svgBlip xmlns:asvg="http://schemas.microsoft.com/office/drawing/2016/SVG/main" r:embed="rId5"/>
-              </a:ext>
-            </a:extLst>
-          </a:blip>
-          <a:stretch>
-            <a:fillRect/>
-          </a:stretch>
-        </p:blipFill>
-        <p:spPr>
-          <a:xfrm>
-            <a:off x="9326106" y="4647496"/>
-            <a:ext cx="1510624" cy="1510624"/>
-          </a:xfrm>
-          <a:prstGeom prst="rect">
-            <a:avLst/>
-          </a:prstGeom>
-        </p:spPr>
-      </p:pic>
-    </p:spTree>
-    <p:extLst>
-      <p:ext uri="{BB962C8B-B14F-4D97-AF65-F5344CB8AC3E}">
-        <p14:creationId xmlns:p14="http://schemas.microsoft.com/office/powerpoint/2010/main" val="2055929795"/>
-      </p:ext>
-    </p:extLst>
-  </p:cSld>
-  <p:clrMapOvr>
-    <a:masterClrMapping/>
-  </p:clrMapOvr>
-  <mc:AlternateContent xmlns:mc="http://schemas.openxmlformats.org/markup-compatibility/2006">
-    <mc:Choice xmlns:p15="http://schemas.microsoft.com/office/powerpoint/2012/main" Requires="p15">
-      <p:transition xmlns:p14="http://schemas.microsoft.com/office/powerpoint/2010/main" spd="slow" p14:dur="1250">
-        <p15:prstTrans prst="airplane"/>
-      </p:transition>
-    </mc:Choice>
-    <mc:Fallback>
+    <mc:Fallback xmlns="">
       <p:transition spd="slow">
         <p:fade/>
       </p:transition>

</xml_diff>